<commit_message>
läd jetzt auch ohne irgendwas
</commit_message>
<xml_diff>
--- a/Unterlagen/Praesi_Technologiemanagement.pptx
+++ b/Unterlagen/Praesi_Technologiemanagement.pptx
@@ -463,13 +463,18 @@
             <a:fld id="{845091AC-0297-4EFC-B3DE-991E2C667800}" type="slidenum">
               <a:rPr lang="de-DE"/>
               <a:pPr/>
-              <a:t>‹Nr.›</a:t>
+              <a:t>‹#›</a:t>
             </a:fld>
             <a:endParaRPr lang="de-DE"/>
           </a:p>
         </p:txBody>
       </p:sp>
     </p:spTree>
+    <p:extLst>
+      <p:ext uri="{BB962C8B-B14F-4D97-AF65-F5344CB8AC3E}">
+        <p14:creationId xmlns:p14="http://schemas.microsoft.com/office/powerpoint/2010/main" val="1241540581"/>
+      </p:ext>
+    </p:extLst>
   </p:cSld>
   <p:clrMap bg1="lt1" tx1="dk1" bg2="lt2" tx2="dk2" accent1="accent1" accent2="accent2" accent3="accent3" accent4="accent4" accent5="accent5" accent6="accent6" hlink="hlink" folHlink="folHlink"/>
   <p:notesStyle>
@@ -2657,7 +2662,7 @@
                   <a:spcPct val="50000"/>
                 </a:spcBef>
               </a:pPr>
-              <a:t>Freitag, 28. Juni 2013</a:t>
+              <a:t>Sunday, 30. June 13</a:t>
             </a:fld>
             <a:r>
               <a:rPr lang="de-DE" sz="1000" dirty="0" smtClean="0">
@@ -2682,7 +2687,7 @@
                   <a:spcPct val="50000"/>
                 </a:spcBef>
               </a:pPr>
-              <a:t>‹Nr.›</a:t>
+              <a:t>‹#›</a:t>
             </a:fld>
             <a:endParaRPr lang="de-DE" sz="1000" dirty="0"/>
           </a:p>
@@ -3122,9 +3127,84 @@
         </p:xfrm>
         <a:graphic>
           <a:graphicData uri="http://schemas.openxmlformats.org/presentationml/2006/ole">
-            <p:oleObj spid="_x0000_s15362" name="Bitmap" r:id="rId3" imgW="3677163" imgH="1181265" progId="PBrush">
-              <p:embed/>
-            </p:oleObj>
+            <mc:AlternateContent xmlns:mc="http://schemas.openxmlformats.org/markup-compatibility/2006">
+              <mc:Choice xmlns:v="urn:schemas-microsoft-com:vml" Requires="v">
+                <p:oleObj spid="_x0000_s15370" name="Bitmap" r:id="rId3" imgW="3677163" imgH="1181265" progId="PBrush">
+                  <p:embed/>
+                </p:oleObj>
+              </mc:Choice>
+              <mc:Fallback>
+                <p:oleObj name="Bitmap" r:id="rId3" imgW="3677163" imgH="1181265" progId="PBrush">
+                  <p:embed/>
+                  <p:pic>
+                    <p:nvPicPr>
+                      <p:cNvPr id="0" name="Object 12"/>
+                      <p:cNvPicPr>
+                        <a:picLocks noChangeAspect="1" noChangeArrowheads="1"/>
+                      </p:cNvPicPr>
+                      <p:nvPr/>
+                    </p:nvPicPr>
+                    <p:blipFill>
+                      <a:blip r:embed="rId4">
+                        <a:extLst>
+                          <a:ext uri="{28A0092B-C50C-407E-A947-70E740481C1C}">
+                            <a14:useLocalDpi xmlns:a14="http://schemas.microsoft.com/office/drawing/2010/main" val="0"/>
+                          </a:ext>
+                        </a:extLst>
+                      </a:blip>
+                      <a:srcRect/>
+                      <a:stretch>
+                        <a:fillRect/>
+                      </a:stretch>
+                    </p:blipFill>
+                    <p:spPr bwMode="auto">
+                      <a:xfrm>
+                        <a:off x="179388" y="44450"/>
+                        <a:ext cx="2879725" cy="925513"/>
+                      </a:xfrm>
+                      <a:prstGeom prst="rect">
+                        <a:avLst/>
+                      </a:prstGeom>
+                      <a:noFill/>
+                      <a:ln>
+                        <a:noFill/>
+                      </a:ln>
+                      <a:effectLst/>
+                      <a:extLst>
+                        <a:ext uri="{909E8E84-426E-40dd-AFC4-6F175D3DCCD1}">
+                          <a14:hiddenFill xmlns:a14="http://schemas.microsoft.com/office/drawing/2010/main">
+                            <a:solidFill>
+                              <a:schemeClr val="accent1"/>
+                            </a:solidFill>
+                          </a14:hiddenFill>
+                        </a:ext>
+                        <a:ext uri="{91240B29-F687-4f45-9708-019B960494DF}">
+                          <a14:hiddenLine xmlns:a14="http://schemas.microsoft.com/office/drawing/2010/main" w="9525">
+                            <a:solidFill>
+                              <a:schemeClr val="tx1"/>
+                            </a:solidFill>
+                            <a:miter lim="800000"/>
+                            <a:headEnd/>
+                            <a:tailEnd/>
+                          </a14:hiddenLine>
+                        </a:ext>
+                        <a:ext uri="{AF507438-7753-43e0-B8FC-AC1667EBCBE1}">
+                          <a14:hiddenEffects xmlns:a14="http://schemas.microsoft.com/office/drawing/2010/main">
+                            <a:effectLst>
+                              <a:outerShdw blurRad="63500" dist="38099" dir="2700000" algn="ctr" rotWithShape="0">
+                                <a:schemeClr val="bg2">
+                                  <a:alpha val="74998"/>
+                                </a:schemeClr>
+                              </a:outerShdw>
+                            </a:effectLst>
+                          </a14:hiddenEffects>
+                        </a:ext>
+                      </a:extLst>
+                    </p:spPr>
+                  </p:pic>
+                </p:oleObj>
+              </mc:Fallback>
+            </mc:AlternateContent>
           </a:graphicData>
         </a:graphic>
       </p:graphicFrame>
@@ -3403,7 +3483,7 @@
   <p:timing>
     <p:tnLst>
       <p:par>
-        <p:cTn id="1" dur="indefinite" restart="never" nodeType="tmRoot"/>
+        <p:cTn xmlns:p14="http://schemas.microsoft.com/office/powerpoint/2010/main" id="1" dur="indefinite" restart="never" nodeType="tmRoot"/>
       </p:par>
     </p:tnLst>
   </p:timing>
@@ -3510,10 +3590,6 @@
               <a:rPr lang="de-DE" dirty="0" smtClean="0"/>
               <a:t>GUI</a:t>
             </a:r>
-            <a:r>
-              <a:rPr lang="de-DE" dirty="0" smtClean="0"/>
-              <a:t/>
-            </a:r>
             <a:br>
               <a:rPr lang="de-DE" dirty="0" smtClean="0"/>
             </a:br>
@@ -3521,7 +3597,6 @@
               <a:rPr lang="de-DE" sz="2000" dirty="0" smtClean="0"/>
               <a:t>Vergleichen/Analyse/Graph 1/3</a:t>
             </a:r>
-            <a:endParaRPr lang="de-DE" sz="2000" dirty="0" smtClean="0"/>
           </a:p>
         </p:txBody>
       </p:sp>
@@ -3625,7 +3700,6 @@
               <a:rPr lang="de-DE" dirty="0" smtClean="0"/>
               <a:t>Unsere Konzepte</a:t>
             </a:r>
-            <a:endParaRPr lang="de-DE" dirty="0" smtClean="0"/>
           </a:p>
           <a:p>
             <a:pPr lvl="1" eaLnBrk="1" hangingPunct="1"/>
@@ -3633,7 +3707,6 @@
               <a:rPr lang="de-DE" dirty="0" smtClean="0"/>
               <a:t>User und Artikel</a:t>
             </a:r>
-            <a:endParaRPr lang="de-DE" dirty="0" smtClean="0"/>
           </a:p>
           <a:p>
             <a:pPr lvl="1" eaLnBrk="1" hangingPunct="1"/>
@@ -3641,6 +3714,7 @@
               <a:rPr lang="de-DE" dirty="0" smtClean="0"/>
               <a:t>Änderungen und Versionen</a:t>
             </a:r>
+            <a:endParaRPr lang="de-DE" dirty="0" smtClean="0"/>
           </a:p>
           <a:p>
             <a:pPr lvl="1" eaLnBrk="1" hangingPunct="1"/>
@@ -3648,7 +3722,6 @@
               <a:rPr lang="de-DE" dirty="0" smtClean="0"/>
               <a:t>Kategorisierungen</a:t>
             </a:r>
-            <a:endParaRPr lang="de-DE" dirty="0" smtClean="0"/>
           </a:p>
           <a:p>
             <a:pPr lvl="1" eaLnBrk="1" hangingPunct="1">
@@ -3663,7 +3736,6 @@
               <a:rPr lang="de-DE" dirty="0" smtClean="0"/>
               <a:t>GUI</a:t>
             </a:r>
-            <a:endParaRPr lang="de-DE" dirty="0" smtClean="0"/>
           </a:p>
           <a:p>
             <a:pPr lvl="1" eaLnBrk="1" hangingPunct="1"/>
@@ -3671,7 +3743,6 @@
               <a:rPr lang="de-DE" dirty="0" smtClean="0"/>
               <a:t>Wiki-API</a:t>
             </a:r>
-            <a:endParaRPr lang="de-DE" dirty="0" smtClean="0"/>
           </a:p>
           <a:p>
             <a:pPr lvl="1" eaLnBrk="1" hangingPunct="1"/>
@@ -3679,7 +3750,6 @@
               <a:rPr lang="de-DE" dirty="0" smtClean="0"/>
               <a:t>Datenbank</a:t>
             </a:r>
-            <a:endParaRPr lang="de-DE" dirty="0" smtClean="0"/>
           </a:p>
           <a:p>
             <a:pPr lvl="1" eaLnBrk="1" hangingPunct="1"/>
@@ -3687,7 +3757,6 @@
               <a:rPr lang="de-DE" dirty="0" smtClean="0"/>
               <a:t>Vergleichen/Analyse/Graph</a:t>
             </a:r>
-            <a:endParaRPr lang="de-DE" dirty="0" smtClean="0"/>
           </a:p>
           <a:p>
             <a:pPr lvl="1" eaLnBrk="1" hangingPunct="1"/>
@@ -3695,7 +3764,6 @@
               <a:rPr lang="de-DE" dirty="0" smtClean="0"/>
               <a:t>Expertensuche</a:t>
             </a:r>
-            <a:endParaRPr lang="de-DE" dirty="0" smtClean="0"/>
           </a:p>
         </p:txBody>
       </p:sp>
@@ -3707,7 +3775,7 @@
   <p:timing>
     <p:tnLst>
       <p:par>
-        <p:cTn id="1" dur="indefinite" restart="never" nodeType="tmRoot"/>
+        <p:cTn xmlns:p14="http://schemas.microsoft.com/office/powerpoint/2010/main" id="1" dur="indefinite" restart="never" nodeType="tmRoot"/>
       </p:par>
     </p:tnLst>
   </p:timing>
@@ -3754,11 +3822,11 @@
             <a:pPr eaLnBrk="1" hangingPunct="1"/>
             <a:r>
               <a:rPr lang="de-DE" dirty="0" smtClean="0"/>
-              <a:t>Unsere Konzepte</a:t>
+              <a:t>Das </a:t>
             </a:r>
             <a:r>
               <a:rPr lang="de-DE" dirty="0" smtClean="0"/>
-              <a:t/>
+              <a:t>Konzepte</a:t>
             </a:r>
             <a:br>
               <a:rPr lang="de-DE" dirty="0" smtClean="0"/>
@@ -3767,7 +3835,6 @@
               <a:rPr lang="de-DE" sz="2000" dirty="0" smtClean="0"/>
               <a:t>User und Artikel</a:t>
             </a:r>
-            <a:endParaRPr lang="de-DE" sz="2000" dirty="0" smtClean="0"/>
           </a:p>
         </p:txBody>
       </p:sp>
@@ -3897,16 +3964,12 @@
               <a:buChar char="-"/>
             </a:pPr>
             <a:r>
+              <a:rPr lang="de-DE" smtClean="0"/>
+              <a:t>U2_(</a:t>
+            </a:r>
+            <a:r>
               <a:rPr lang="de-DE" dirty="0" smtClean="0"/>
-              <a:t>U2 (</a:t>
-            </a:r>
-            <a:r>
-              <a:rPr lang="de-DE" dirty="0" smtClean="0"/>
-              <a:t>Band</a:t>
-            </a:r>
-            <a:r>
-              <a:rPr lang="de-DE" dirty="0" smtClean="0"/>
-              <a:t>)</a:t>
+              <a:t>Band)</a:t>
             </a:r>
           </a:p>
           <a:p>
@@ -3998,11 +4061,11 @@
             <a:pPr eaLnBrk="1" hangingPunct="1"/>
             <a:r>
               <a:rPr lang="de-DE" dirty="0" smtClean="0"/>
-              <a:t>Unsere Konzepte</a:t>
+              <a:t>Das </a:t>
             </a:r>
             <a:r>
               <a:rPr lang="de-DE" dirty="0" smtClean="0"/>
-              <a:t/>
+              <a:t>Konzepte</a:t>
             </a:r>
             <a:br>
               <a:rPr lang="de-DE" dirty="0" smtClean="0"/>
@@ -4011,7 +4074,6 @@
               <a:rPr lang="de-DE" sz="2000" dirty="0" smtClean="0"/>
               <a:t>Änderungen und Versionen</a:t>
             </a:r>
-            <a:endParaRPr lang="de-DE" sz="2000" dirty="0" smtClean="0"/>
           </a:p>
         </p:txBody>
       </p:sp>
@@ -4087,11 +4149,22 @@
             </a:pPr>
             <a:r>
               <a:rPr lang="de-DE" dirty="0" smtClean="0"/>
-              <a:t>Artikeländerungstypen:  Korrektur, Formatierung, Verbesserung, Wissensproduktion, Überarbeitung und Keine Änderung</a:t>
-            </a:r>
+              <a:t>Artikeländerungstypen:  Korrektur, Formatierung, Verbesserung, Wissensproduktion, Überarbeitung und Keine </a:t>
+            </a:r>
+            <a:r>
+              <a:rPr lang="de-DE" dirty="0" smtClean="0"/>
+              <a:t>Änderung</a:t>
+            </a:r>
+            <a:endParaRPr lang="de-DE" dirty="0"/>
           </a:p>
           <a:p>
             <a:pPr lvl="1">
+              <a:spcBef>
+                <a:spcPts val="600"/>
+              </a:spcBef>
+              <a:spcAft>
+                <a:spcPts val="600"/>
+              </a:spcAft>
               <a:buFont typeface="Symbol" pitchFamily="18" charset="2"/>
               <a:buChar char="-"/>
               <a:defRPr/>
@@ -4181,11 +4254,11 @@
             <a:pPr eaLnBrk="1" hangingPunct="1"/>
             <a:r>
               <a:rPr lang="de-DE" dirty="0" smtClean="0"/>
-              <a:t>Unsere Konzepte</a:t>
+              <a:t>Das </a:t>
             </a:r>
             <a:r>
               <a:rPr lang="de-DE" dirty="0" smtClean="0"/>
-              <a:t/>
+              <a:t>Konzepte</a:t>
             </a:r>
             <a:br>
               <a:rPr lang="de-DE" dirty="0" smtClean="0"/>
@@ -4194,7 +4267,6 @@
               <a:rPr lang="de-DE" sz="2000" dirty="0" smtClean="0"/>
               <a:t>Kategorisierung</a:t>
             </a:r>
-            <a:endParaRPr lang="de-DE" sz="2000" dirty="0" smtClean="0"/>
           </a:p>
         </p:txBody>
       </p:sp>
@@ -4243,27 +4315,8 @@
                 <a:ea typeface="+mn-ea"/>
                 <a:cs typeface="+mn-cs"/>
               </a:rPr>
-              <a:t>Chaos </a:t>
-            </a:r>
-            <a:r>
-              <a:rPr lang="de-DE" dirty="0" smtClean="0">
-                <a:solidFill>
-                  <a:schemeClr val="tx1"/>
-                </a:solidFill>
-                <a:latin typeface="+mn-lt"/>
-                <a:ea typeface="+mn-ea"/>
-                <a:cs typeface="+mn-cs"/>
-              </a:rPr>
-              <a:t>Computer Club? </a:t>
-            </a:r>
-            <a:endParaRPr lang="de-DE" dirty="0" smtClean="0">
-              <a:solidFill>
-                <a:schemeClr val="tx1"/>
-              </a:solidFill>
-              <a:latin typeface="+mn-lt"/>
-              <a:ea typeface="+mn-ea"/>
-              <a:cs typeface="+mn-cs"/>
-            </a:endParaRPr>
+              <a:t>Chaos Computer Club? </a:t>
+            </a:r>
           </a:p>
           <a:p>
             <a:pPr lvl="1">
@@ -4313,8 +4366,14 @@
                 <a:ea typeface="+mn-ea"/>
                 <a:cs typeface="+mn-cs"/>
               </a:rPr>
-              <a:t>Homöopathie und Hydrotherapie</a:t>
-            </a:r>
+              <a:t>Homöopathie und Hydrotherapie?  </a:t>
+            </a:r>
+          </a:p>
+          <a:p>
+            <a:pPr lvl="1">
+              <a:buFont typeface="Symbol" pitchFamily="18" charset="2"/>
+              <a:buChar char="-"/>
+            </a:pPr>
             <a:r>
               <a:rPr lang="de-DE" dirty="0" smtClean="0">
                 <a:solidFill>
@@ -4324,7 +4383,7 @@
                 <a:ea typeface="+mn-ea"/>
                 <a:cs typeface="+mn-cs"/>
               </a:rPr>
-              <a:t>?  </a:t>
+              <a:t>Rockband und The Dubliners  </a:t>
             </a:r>
           </a:p>
           <a:p>
@@ -4341,8 +4400,14 @@
                 <a:ea typeface="+mn-ea"/>
                 <a:cs typeface="+mn-cs"/>
               </a:rPr>
-              <a:t>Rockband und The </a:t>
-            </a:r>
+              <a:t>U2  und Irische Band </a:t>
+            </a:r>
+          </a:p>
+          <a:p>
+            <a:pPr lvl="1">
+              <a:buFont typeface="Symbol" pitchFamily="18" charset="2"/>
+              <a:buChar char="-"/>
+            </a:pPr>
             <a:r>
               <a:rPr lang="de-DE" dirty="0" smtClean="0">
                 <a:solidFill>
@@ -4352,104 +4417,7 @@
                 <a:ea typeface="+mn-ea"/>
                 <a:cs typeface="+mn-cs"/>
               </a:rPr>
-              <a:t>Dubliners  </a:t>
-            </a:r>
-            <a:endParaRPr lang="de-DE" dirty="0" smtClean="0">
-              <a:solidFill>
-                <a:schemeClr val="tx1"/>
-              </a:solidFill>
-              <a:latin typeface="+mn-lt"/>
-              <a:ea typeface="+mn-ea"/>
-              <a:cs typeface="+mn-cs"/>
-            </a:endParaRPr>
-          </a:p>
-          <a:p>
-            <a:pPr lvl="1">
-              <a:buFont typeface="Symbol" pitchFamily="18" charset="2"/>
-              <a:buChar char="-"/>
-            </a:pPr>
-            <a:r>
-              <a:rPr lang="de-DE" dirty="0" smtClean="0">
-                <a:solidFill>
-                  <a:schemeClr val="tx1"/>
-                </a:solidFill>
-                <a:latin typeface="+mn-lt"/>
-                <a:ea typeface="+mn-ea"/>
-                <a:cs typeface="+mn-cs"/>
-              </a:rPr>
-              <a:t>U2 </a:t>
-            </a:r>
-            <a:r>
-              <a:rPr lang="de-DE" dirty="0" smtClean="0">
-                <a:solidFill>
-                  <a:schemeClr val="tx1"/>
-                </a:solidFill>
-                <a:latin typeface="+mn-lt"/>
-                <a:ea typeface="+mn-ea"/>
-                <a:cs typeface="+mn-cs"/>
-              </a:rPr>
-              <a:t> </a:t>
-            </a:r>
-            <a:r>
-              <a:rPr lang="de-DE" dirty="0" smtClean="0">
-                <a:solidFill>
-                  <a:schemeClr val="tx1"/>
-                </a:solidFill>
-                <a:latin typeface="+mn-lt"/>
-                <a:ea typeface="+mn-ea"/>
-                <a:cs typeface="+mn-cs"/>
-              </a:rPr>
-              <a:t>und Irische </a:t>
-            </a:r>
-            <a:r>
-              <a:rPr lang="de-DE" dirty="0" smtClean="0">
-                <a:solidFill>
-                  <a:schemeClr val="tx1"/>
-                </a:solidFill>
-                <a:latin typeface="+mn-lt"/>
-                <a:ea typeface="+mn-ea"/>
-                <a:cs typeface="+mn-cs"/>
-              </a:rPr>
-              <a:t>Band </a:t>
-            </a:r>
-          </a:p>
-          <a:p>
-            <a:pPr lvl="1">
-              <a:buFont typeface="Symbol" pitchFamily="18" charset="2"/>
-              <a:buChar char="-"/>
-            </a:pPr>
-            <a:r>
-              <a:rPr lang="de-DE" dirty="0" smtClean="0">
-                <a:solidFill>
-                  <a:schemeClr val="tx1"/>
-                </a:solidFill>
-                <a:latin typeface="+mn-lt"/>
-                <a:ea typeface="+mn-ea"/>
-                <a:cs typeface="+mn-cs"/>
-              </a:rPr>
-              <a:t>Unternehmensberater </a:t>
-            </a:r>
-            <a:r>
-              <a:rPr lang="de-DE" dirty="0" smtClean="0">
-                <a:solidFill>
-                  <a:schemeClr val="tx1"/>
-                </a:solidFill>
-                <a:latin typeface="+mn-lt"/>
-                <a:ea typeface="+mn-ea"/>
-                <a:cs typeface="+mn-cs"/>
-              </a:rPr>
-              <a:t> und New </a:t>
-            </a:r>
-            <a:r>
-              <a:rPr lang="de-DE" dirty="0" smtClean="0">
-                <a:solidFill>
-                  <a:schemeClr val="tx1"/>
-                </a:solidFill>
-                <a:latin typeface="+mn-lt"/>
-                <a:ea typeface="+mn-ea"/>
-                <a:cs typeface="+mn-cs"/>
-              </a:rPr>
-              <a:t>Economy</a:t>
+              <a:t>Unternehmensberater  und New Economy</a:t>
             </a:r>
             <a:endParaRPr lang="de-DE" dirty="0"/>
           </a:p>
@@ -4518,7 +4486,6 @@
               <a:rPr lang="de-DE" dirty="0" smtClean="0"/>
               <a:t>Einfügen der Artikel in die Datenbank</a:t>
             </a:r>
-            <a:endParaRPr lang="de-DE" dirty="0" smtClean="0"/>
           </a:p>
           <a:p>
             <a:pPr>
@@ -4581,10 +4548,6 @@
               <a:rPr lang="de-DE" dirty="0" smtClean="0"/>
               <a:t>GUI</a:t>
             </a:r>
-            <a:r>
-              <a:rPr lang="de-DE" dirty="0" smtClean="0"/>
-              <a:t/>
-            </a:r>
             <a:br>
               <a:rPr lang="de-DE" dirty="0" smtClean="0"/>
             </a:br>
@@ -4592,7 +4555,6 @@
               <a:rPr lang="de-DE" sz="2000" dirty="0" smtClean="0"/>
               <a:t>Wiki-API</a:t>
             </a:r>
-            <a:endParaRPr lang="de-DE" sz="2000" dirty="0" smtClean="0"/>
           </a:p>
         </p:txBody>
       </p:sp>
@@ -4708,10 +4670,6 @@
               <a:rPr lang="de-DE" dirty="0" smtClean="0"/>
               <a:t>GUI</a:t>
             </a:r>
-            <a:r>
-              <a:rPr lang="de-DE" dirty="0" smtClean="0"/>
-              <a:t/>
-            </a:r>
             <a:br>
               <a:rPr lang="de-DE" dirty="0" smtClean="0"/>
             </a:br>
@@ -4719,7 +4677,6 @@
               <a:rPr lang="de-DE" sz="2000" dirty="0" smtClean="0"/>
               <a:t>Datenbank</a:t>
             </a:r>
-            <a:endParaRPr lang="de-DE" sz="2000" dirty="0" smtClean="0"/>
           </a:p>
         </p:txBody>
       </p:sp>
@@ -4838,10 +4795,6 @@
               <a:rPr lang="de-DE" dirty="0" smtClean="0"/>
               <a:t>GUI</a:t>
             </a:r>
-            <a:r>
-              <a:rPr lang="de-DE" dirty="0" smtClean="0"/>
-              <a:t/>
-            </a:r>
             <a:br>
               <a:rPr lang="de-DE" dirty="0" smtClean="0"/>
             </a:br>
@@ -4849,7 +4802,6 @@
               <a:rPr lang="de-DE" sz="2000" dirty="0" smtClean="0"/>
               <a:t>Vergleichen/Analyse/Graph 1/3</a:t>
             </a:r>
-            <a:endParaRPr lang="de-DE" sz="2000" dirty="0" smtClean="0"/>
           </a:p>
         </p:txBody>
       </p:sp>
@@ -4968,10 +4920,6 @@
               <a:rPr lang="de-DE" dirty="0" smtClean="0"/>
               <a:t>GUI</a:t>
             </a:r>
-            <a:r>
-              <a:rPr lang="de-DE" dirty="0" smtClean="0"/>
-              <a:t/>
-            </a:r>
             <a:br>
               <a:rPr lang="de-DE" dirty="0" smtClean="0"/>
             </a:br>
@@ -4979,7 +4927,6 @@
               <a:rPr lang="de-DE" sz="2000" dirty="0" smtClean="0"/>
               <a:t>Vergleichen/Analyse/Graph 2/3</a:t>
             </a:r>
-            <a:endParaRPr lang="de-DE" sz="2000" dirty="0" smtClean="0"/>
           </a:p>
         </p:txBody>
       </p:sp>

</xml_diff>